<commit_message>
update slides modules 1 and 2
</commit_message>
<xml_diff>
--- a/slides/slides_module_1.pptx
+++ b/slides/slides_module_1.pptx
@@ -295,6 +295,7 @@
 <p1510:revInfo xmlns:a="http://schemas.openxmlformats.org/drawingml/2006/main" xmlns:r="http://schemas.openxmlformats.org/officeDocument/2006/relationships" xmlns:p1510="http://schemas.microsoft.com/office/powerpoint/2015/10/main">
   <p1510:revLst>
     <p1510:client id="{14CE2944-8739-4012-B97C-9A9A8C8E675E}" v="14" dt="2024-07-01T08:48:28.267"/>
+    <p1510:client id="{D4C4542F-1DA7-4F8A-9783-933C3C83297E}" v="4" dt="2024-07-01T14:56:57.663"/>
   </p1510:revLst>
 </p1510:revInfo>
 </file>
@@ -304,7 +305,7 @@
   <pc:docChgLst>
     <pc:chgData name="Lena Gschossmann" userId="bfd8fa5b3c2be1bd" providerId="LiveId" clId="{D4C4542F-1DA7-4F8A-9783-933C3C83297E}"/>
     <pc:docChg chg="undo custSel addSld delSld modSld">
-      <pc:chgData name="Lena Gschossmann" userId="bfd8fa5b3c2be1bd" providerId="LiveId" clId="{D4C4542F-1DA7-4F8A-9783-933C3C83297E}" dt="2024-07-01T09:04:25.348" v="209" actId="403"/>
+      <pc:chgData name="Lena Gschossmann" userId="bfd8fa5b3c2be1bd" providerId="LiveId" clId="{D4C4542F-1DA7-4F8A-9783-933C3C83297E}" dt="2024-07-01T14:58:15.417" v="289" actId="1037"/>
       <pc:docMkLst>
         <pc:docMk/>
       </pc:docMkLst>
@@ -350,18 +351,82 @@
           <pc:sldMk cId="1828065030" sldId="266"/>
         </pc:sldMkLst>
       </pc:sldChg>
-      <pc:sldChg chg="modSp mod">
-        <pc:chgData name="Lena Gschossmann" userId="bfd8fa5b3c2be1bd" providerId="LiveId" clId="{D4C4542F-1DA7-4F8A-9783-933C3C83297E}" dt="2024-07-01T09:04:25.348" v="209" actId="403"/>
+      <pc:sldChg chg="addSp delSp modSp mod">
+        <pc:chgData name="Lena Gschossmann" userId="bfd8fa5b3c2be1bd" providerId="LiveId" clId="{D4C4542F-1DA7-4F8A-9783-933C3C83297E}" dt="2024-07-01T14:58:15.417" v="289" actId="1037"/>
         <pc:sldMkLst>
           <pc:docMk/>
           <pc:sldMk cId="3264522944" sldId="267"/>
         </pc:sldMkLst>
+        <pc:spChg chg="add del mod">
+          <ac:chgData name="Lena Gschossmann" userId="bfd8fa5b3c2be1bd" providerId="LiveId" clId="{D4C4542F-1DA7-4F8A-9783-933C3C83297E}" dt="2024-07-01T14:56:49.510" v="264" actId="478"/>
+          <ac:spMkLst>
+            <pc:docMk/>
+            <pc:sldMk cId="3264522944" sldId="267"/>
+            <ac:spMk id="2" creationId="{5F646165-6CF8-C336-CEBA-F540CC9E427E}"/>
+          </ac:spMkLst>
+        </pc:spChg>
         <pc:spChg chg="mod">
           <ac:chgData name="Lena Gschossmann" userId="bfd8fa5b3c2be1bd" providerId="LiveId" clId="{D4C4542F-1DA7-4F8A-9783-933C3C83297E}" dt="2024-07-01T09:04:25.348" v="209" actId="403"/>
           <ac:spMkLst>
             <pc:docMk/>
             <pc:sldMk cId="3264522944" sldId="267"/>
             <ac:spMk id="4" creationId="{6BFAE7B6-A918-8881-29C4-A1ABD43EA5FC}"/>
+          </ac:spMkLst>
+        </pc:spChg>
+        <pc:spChg chg="add del mod">
+          <ac:chgData name="Lena Gschossmann" userId="bfd8fa5b3c2be1bd" providerId="LiveId" clId="{D4C4542F-1DA7-4F8A-9783-933C3C83297E}" dt="2024-07-01T14:56:57.035" v="268" actId="478"/>
+          <ac:spMkLst>
+            <pc:docMk/>
+            <pc:sldMk cId="3264522944" sldId="267"/>
+            <ac:spMk id="5" creationId="{942F33F2-8EBB-B0E1-FC0A-759C74D10592}"/>
+          </ac:spMkLst>
+        </pc:spChg>
+        <pc:spChg chg="add del mod">
+          <ac:chgData name="Lena Gschossmann" userId="bfd8fa5b3c2be1bd" providerId="LiveId" clId="{D4C4542F-1DA7-4F8A-9783-933C3C83297E}" dt="2024-07-01T14:56:55.628" v="267" actId="478"/>
+          <ac:spMkLst>
+            <pc:docMk/>
+            <pc:sldMk cId="3264522944" sldId="267"/>
+            <ac:spMk id="7" creationId="{95934080-F3FB-AE94-F2AE-A82C3B990BB6}"/>
+          </ac:spMkLst>
+        </pc:spChg>
+        <pc:spChg chg="mod">
+          <ac:chgData name="Lena Gschossmann" userId="bfd8fa5b3c2be1bd" providerId="LiveId" clId="{D4C4542F-1DA7-4F8A-9783-933C3C83297E}" dt="2024-07-01T14:58:15.417" v="289" actId="1037"/>
+          <ac:spMkLst>
+            <pc:docMk/>
+            <pc:sldMk cId="3264522944" sldId="267"/>
+            <ac:spMk id="8" creationId="{E780E44D-9987-F2E8-1A90-63327BD9E2DA}"/>
+          </ac:spMkLst>
+        </pc:spChg>
+        <pc:spChg chg="add del mod">
+          <ac:chgData name="Lena Gschossmann" userId="bfd8fa5b3c2be1bd" providerId="LiveId" clId="{D4C4542F-1DA7-4F8A-9783-933C3C83297E}" dt="2024-07-01T14:56:55.628" v="267" actId="478"/>
+          <ac:spMkLst>
+            <pc:docMk/>
+            <pc:sldMk cId="3264522944" sldId="267"/>
+            <ac:spMk id="9" creationId="{703CF711-CF52-49B6-004C-9BBBBE599F7E}"/>
+          </ac:spMkLst>
+        </pc:spChg>
+        <pc:spChg chg="add mod">
+          <ac:chgData name="Lena Gschossmann" userId="bfd8fa5b3c2be1bd" providerId="LiveId" clId="{D4C4542F-1DA7-4F8A-9783-933C3C83297E}" dt="2024-07-01T14:57:03.402" v="282" actId="20577"/>
+          <ac:spMkLst>
+            <pc:docMk/>
+            <pc:sldMk cId="3264522944" sldId="267"/>
+            <ac:spMk id="10" creationId="{15364377-E776-D700-A927-504937B3FF79}"/>
+          </ac:spMkLst>
+        </pc:spChg>
+        <pc:spChg chg="add mod">
+          <ac:chgData name="Lena Gschossmann" userId="bfd8fa5b3c2be1bd" providerId="LiveId" clId="{D4C4542F-1DA7-4F8A-9783-933C3C83297E}" dt="2024-07-01T14:56:57.663" v="269"/>
+          <ac:spMkLst>
+            <pc:docMk/>
+            <pc:sldMk cId="3264522944" sldId="267"/>
+            <ac:spMk id="11" creationId="{98AE5824-9B33-01A2-1828-794EFAF17462}"/>
+          </ac:spMkLst>
+        </pc:spChg>
+        <pc:spChg chg="del mod">
+          <ac:chgData name="Lena Gschossmann" userId="bfd8fa5b3c2be1bd" providerId="LiveId" clId="{D4C4542F-1DA7-4F8A-9783-933C3C83297E}" dt="2024-07-01T14:56:52.231" v="265" actId="478"/>
+          <ac:spMkLst>
+            <pc:docMk/>
+            <pc:sldMk cId="3264522944" sldId="267"/>
+            <ac:spMk id="12" creationId="{00000000-0000-0000-0000-000000000000}"/>
           </ac:spMkLst>
         </pc:spChg>
       </pc:sldChg>
@@ -404,14 +469,22 @@
           </ac:graphicFrameMkLst>
         </pc:graphicFrameChg>
       </pc:sldChg>
-      <pc:sldChg chg="delSp modSp add mod">
-        <pc:chgData name="Lena Gschossmann" userId="bfd8fa5b3c2be1bd" providerId="LiveId" clId="{D4C4542F-1DA7-4F8A-9783-933C3C83297E}" dt="2024-07-01T09:04:20.338" v="208" actId="403"/>
+      <pc:sldChg chg="addSp delSp modSp add mod">
+        <pc:chgData name="Lena Gschossmann" userId="bfd8fa5b3c2be1bd" providerId="LiveId" clId="{D4C4542F-1DA7-4F8A-9783-933C3C83297E}" dt="2024-07-01T14:56:43.500" v="262" actId="1076"/>
         <pc:sldMkLst>
           <pc:docMk/>
           <pc:sldMk cId="1123115968" sldId="268"/>
         </pc:sldMkLst>
+        <pc:spChg chg="add mod">
+          <ac:chgData name="Lena Gschossmann" userId="bfd8fa5b3c2be1bd" providerId="LiveId" clId="{D4C4542F-1DA7-4F8A-9783-933C3C83297E}" dt="2024-07-01T14:56:43.500" v="262" actId="1076"/>
+          <ac:spMkLst>
+            <pc:docMk/>
+            <pc:sldMk cId="1123115968" sldId="268"/>
+            <ac:spMk id="2" creationId="{CD0255D7-084D-475A-D52D-F8A039DCDFE1}"/>
+          </ac:spMkLst>
+        </pc:spChg>
         <pc:spChg chg="mod">
-          <ac:chgData name="Lena Gschossmann" userId="bfd8fa5b3c2be1bd" providerId="LiveId" clId="{D4C4542F-1DA7-4F8A-9783-933C3C83297E}" dt="2024-07-01T09:04:20.338" v="208" actId="403"/>
+          <ac:chgData name="Lena Gschossmann" userId="bfd8fa5b3c2be1bd" providerId="LiveId" clId="{D4C4542F-1DA7-4F8A-9783-933C3C83297E}" dt="2024-07-01T14:55:23.227" v="233" actId="14100"/>
           <ac:spMkLst>
             <pc:docMk/>
             <pc:sldMk cId="1123115968" sldId="268"/>
@@ -427,7 +500,7 @@
           </ac:spMkLst>
         </pc:spChg>
         <pc:spChg chg="mod">
-          <ac:chgData name="Lena Gschossmann" userId="bfd8fa5b3c2be1bd" providerId="LiveId" clId="{D4C4542F-1DA7-4F8A-9783-933C3C83297E}" dt="2024-07-01T09:03:17.578" v="160" actId="20577"/>
+          <ac:chgData name="Lena Gschossmann" userId="bfd8fa5b3c2be1bd" providerId="LiveId" clId="{D4C4542F-1DA7-4F8A-9783-933C3C83297E}" dt="2024-07-01T14:56:43.500" v="262" actId="1076"/>
           <ac:spMkLst>
             <pc:docMk/>
             <pc:sldMk cId="1123115968" sldId="268"/>
@@ -4760,46 +4833,6 @@
       </p:sp>
       <p:sp>
         <p:nvSpPr>
-          <p:cNvPr id="12" name="Thank you for your attention!"/>
-          <p:cNvSpPr txBox="1">
-            <a:spLocks noGrp="1"/>
-          </p:cNvSpPr>
-          <p:nvPr>
-            <p:ph type="title"/>
-          </p:nvPr>
-        </p:nvSpPr>
-        <p:spPr bwMode="auto">
-          <a:xfrm>
-            <a:off x="1111833" y="1152837"/>
-            <a:ext cx="19180975" cy="1690257"/>
-          </a:xfrm>
-          <a:prstGeom prst="rect">
-            <a:avLst/>
-          </a:prstGeom>
-        </p:spPr>
-        <p:txBody>
-          <a:bodyPr>
-            <a:normAutofit/>
-          </a:bodyPr>
-          <a:lstStyle>
-            <a:lvl1pPr>
-              <a:defRPr sz="7500" spc="-150"/>
-            </a:lvl1pPr>
-          </a:lstStyle>
-          <a:p>
-            <a:pPr>
-              <a:defRPr/>
-            </a:pPr>
-            <a:r>
-              <a:rPr lang="de-DE" sz="7000"/>
-              <a:t>Module 1</a:t>
-            </a:r>
-            <a:endParaRPr sz="7000" b="0"/>
-          </a:p>
-        </p:txBody>
-      </p:sp>
-      <p:sp>
-        <p:nvSpPr>
           <p:cNvPr id="4" name="Thank you for your attention!">
             <a:extLst>
               <a:ext uri="{FF2B5EF4-FFF2-40B4-BE49-F238E27FC236}">
@@ -5205,7 +5238,7 @@
         </p:nvSpPr>
         <p:spPr bwMode="auto">
           <a:xfrm>
-            <a:off x="16123921" y="8199120"/>
+            <a:off x="16077029" y="8199120"/>
             <a:ext cx="6583680" cy="3931920"/>
           </a:xfrm>
           <a:prstGeom prst="rect">
@@ -5214,7 +5247,9 @@
           <a:noFill/>
           <a:ln w="254000" cap="flat">
             <a:solidFill>
-              <a:srgbClr val="0070C0"/>
+              <a:schemeClr val="bg2">
+                <a:lumMod val="10000"/>
+              </a:schemeClr>
             </a:solidFill>
             <a:miter lim="400000"/>
           </a:ln>
@@ -5237,6 +5272,315 @@
           <a:p>
             <a:pPr algn="ctr"/>
             <a:endParaRPr lang="LID4096"/>
+          </a:p>
+        </p:txBody>
+      </p:sp>
+      <p:sp>
+        <p:nvSpPr>
+          <p:cNvPr id="10" name="Thank you for your attention!">
+            <a:extLst>
+              <a:ext uri="{FF2B5EF4-FFF2-40B4-BE49-F238E27FC236}">
+                <a16:creationId xmlns:a16="http://schemas.microsoft.com/office/drawing/2014/main" id="{15364377-E776-D700-A927-504937B3FF79}"/>
+              </a:ext>
+            </a:extLst>
+          </p:cNvPr>
+          <p:cNvSpPr txBox="1">
+            <a:spLocks noGrp="1"/>
+          </p:cNvSpPr>
+          <p:nvPr>
+            <p:ph type="title"/>
+          </p:nvPr>
+        </p:nvSpPr>
+        <p:spPr bwMode="auto">
+          <a:xfrm>
+            <a:off x="1111833" y="1533021"/>
+            <a:ext cx="19180975" cy="1690257"/>
+          </a:xfrm>
+          <a:prstGeom prst="rect">
+            <a:avLst/>
+          </a:prstGeom>
+        </p:spPr>
+        <p:txBody>
+          <a:bodyPr>
+            <a:normAutofit/>
+          </a:bodyPr>
+          <a:lstStyle>
+            <a:lvl1pPr>
+              <a:defRPr sz="7500" spc="-150"/>
+            </a:lvl1pPr>
+          </a:lstStyle>
+          <a:p>
+            <a:pPr>
+              <a:defRPr/>
+            </a:pPr>
+            <a:r>
+              <a:rPr lang="de-DE" sz="7000"/>
+              <a:t>Initial Steps</a:t>
+            </a:r>
+            <a:endParaRPr sz="7000" b="0"/>
+          </a:p>
+        </p:txBody>
+      </p:sp>
+      <p:sp>
+        <p:nvSpPr>
+          <p:cNvPr id="11" name="Thank you for your attention!">
+            <a:extLst>
+              <a:ext uri="{FF2B5EF4-FFF2-40B4-BE49-F238E27FC236}">
+                <a16:creationId xmlns:a16="http://schemas.microsoft.com/office/drawing/2014/main" id="{98AE5824-9B33-01A2-1828-794EFAF17462}"/>
+              </a:ext>
+            </a:extLst>
+          </p:cNvPr>
+          <p:cNvSpPr txBox="1">
+            <a:spLocks/>
+          </p:cNvSpPr>
+          <p:nvPr/>
+        </p:nvSpPr>
+        <p:spPr bwMode="auto">
+          <a:xfrm>
+            <a:off x="1111832" y="983816"/>
+            <a:ext cx="19180975" cy="794032"/>
+          </a:xfrm>
+          <a:prstGeom prst="rect">
+            <a:avLst/>
+          </a:prstGeom>
+          <a:ln w="12700">
+            <a:miter lim="400000"/>
+          </a:ln>
+        </p:spPr>
+        <p:txBody>
+          <a:bodyPr lIns="50800" tIns="50800" rIns="50800" bIns="50800">
+            <a:normAutofit/>
+          </a:bodyPr>
+          <a:lstStyle>
+            <a:lvl1pPr marL="0" marR="0" indent="0" algn="l" defTabSz="2438338">
+              <a:lnSpc>
+                <a:spcPct val="80000"/>
+              </a:lnSpc>
+              <a:spcBef>
+                <a:spcPts val="0"/>
+              </a:spcBef>
+              <a:spcAft>
+                <a:spcPts val="0"/>
+              </a:spcAft>
+              <a:buClrTx/>
+              <a:buSzTx/>
+              <a:buFontTx/>
+              <a:buNone/>
+              <a:defRPr sz="7500" b="1" i="0" u="none" strike="noStrike" cap="none" spc="-150">
+                <a:solidFill>
+                  <a:srgbClr val="000000"/>
+                </a:solidFill>
+                <a:latin typeface="+mn-lt"/>
+                <a:ea typeface="+mn-ea"/>
+                <a:cs typeface="+mn-cs"/>
+              </a:defRPr>
+            </a:lvl1pPr>
+            <a:lvl2pPr marL="0" marR="0" indent="457200" algn="l" defTabSz="2438338">
+              <a:lnSpc>
+                <a:spcPct val="80000"/>
+              </a:lnSpc>
+              <a:spcBef>
+                <a:spcPts val="0"/>
+              </a:spcBef>
+              <a:spcAft>
+                <a:spcPts val="0"/>
+              </a:spcAft>
+              <a:buClrTx/>
+              <a:buSzTx/>
+              <a:buFontTx/>
+              <a:buNone/>
+              <a:defRPr sz="8500" b="1" i="0" u="none" strike="noStrike" cap="none" spc="-170">
+                <a:solidFill>
+                  <a:srgbClr val="000000"/>
+                </a:solidFill>
+                <a:latin typeface="+mn-lt"/>
+                <a:ea typeface="+mn-ea"/>
+                <a:cs typeface="+mn-cs"/>
+              </a:defRPr>
+            </a:lvl2pPr>
+            <a:lvl3pPr marL="0" marR="0" indent="914400" algn="l" defTabSz="2438338">
+              <a:lnSpc>
+                <a:spcPct val="80000"/>
+              </a:lnSpc>
+              <a:spcBef>
+                <a:spcPts val="0"/>
+              </a:spcBef>
+              <a:spcAft>
+                <a:spcPts val="0"/>
+              </a:spcAft>
+              <a:buClrTx/>
+              <a:buSzTx/>
+              <a:buFontTx/>
+              <a:buNone/>
+              <a:defRPr sz="8500" b="1" i="0" u="none" strike="noStrike" cap="none" spc="-170">
+                <a:solidFill>
+                  <a:srgbClr val="000000"/>
+                </a:solidFill>
+                <a:latin typeface="+mn-lt"/>
+                <a:ea typeface="+mn-ea"/>
+                <a:cs typeface="+mn-cs"/>
+              </a:defRPr>
+            </a:lvl3pPr>
+            <a:lvl4pPr marL="0" marR="0" indent="1371600" algn="l" defTabSz="2438338">
+              <a:lnSpc>
+                <a:spcPct val="80000"/>
+              </a:lnSpc>
+              <a:spcBef>
+                <a:spcPts val="0"/>
+              </a:spcBef>
+              <a:spcAft>
+                <a:spcPts val="0"/>
+              </a:spcAft>
+              <a:buClrTx/>
+              <a:buSzTx/>
+              <a:buFontTx/>
+              <a:buNone/>
+              <a:defRPr sz="8500" b="1" i="0" u="none" strike="noStrike" cap="none" spc="-170">
+                <a:solidFill>
+                  <a:srgbClr val="000000"/>
+                </a:solidFill>
+                <a:latin typeface="+mn-lt"/>
+                <a:ea typeface="+mn-ea"/>
+                <a:cs typeface="+mn-cs"/>
+              </a:defRPr>
+            </a:lvl4pPr>
+            <a:lvl5pPr marL="0" marR="0" indent="1828800" algn="l" defTabSz="2438338">
+              <a:lnSpc>
+                <a:spcPct val="80000"/>
+              </a:lnSpc>
+              <a:spcBef>
+                <a:spcPts val="0"/>
+              </a:spcBef>
+              <a:spcAft>
+                <a:spcPts val="0"/>
+              </a:spcAft>
+              <a:buClrTx/>
+              <a:buSzTx/>
+              <a:buFontTx/>
+              <a:buNone/>
+              <a:defRPr sz="8500" b="1" i="0" u="none" strike="noStrike" cap="none" spc="-170">
+                <a:solidFill>
+                  <a:srgbClr val="000000"/>
+                </a:solidFill>
+                <a:latin typeface="+mn-lt"/>
+                <a:ea typeface="+mn-ea"/>
+                <a:cs typeface="+mn-cs"/>
+              </a:defRPr>
+            </a:lvl5pPr>
+            <a:lvl6pPr marL="0" marR="0" indent="2286000" algn="l" defTabSz="2438338">
+              <a:lnSpc>
+                <a:spcPct val="80000"/>
+              </a:lnSpc>
+              <a:spcBef>
+                <a:spcPts val="0"/>
+              </a:spcBef>
+              <a:spcAft>
+                <a:spcPts val="0"/>
+              </a:spcAft>
+              <a:buClrTx/>
+              <a:buSzTx/>
+              <a:buFontTx/>
+              <a:buNone/>
+              <a:defRPr sz="8500" b="1" i="0" u="none" strike="noStrike" cap="none" spc="-170">
+                <a:solidFill>
+                  <a:srgbClr val="000000"/>
+                </a:solidFill>
+                <a:latin typeface="+mn-lt"/>
+                <a:ea typeface="+mn-ea"/>
+                <a:cs typeface="+mn-cs"/>
+              </a:defRPr>
+            </a:lvl6pPr>
+            <a:lvl7pPr marL="0" marR="0" indent="2743200" algn="l" defTabSz="2438338">
+              <a:lnSpc>
+                <a:spcPct val="80000"/>
+              </a:lnSpc>
+              <a:spcBef>
+                <a:spcPts val="0"/>
+              </a:spcBef>
+              <a:spcAft>
+                <a:spcPts val="0"/>
+              </a:spcAft>
+              <a:buClrTx/>
+              <a:buSzTx/>
+              <a:buFontTx/>
+              <a:buNone/>
+              <a:defRPr sz="8500" b="1" i="0" u="none" strike="noStrike" cap="none" spc="-170">
+                <a:solidFill>
+                  <a:srgbClr val="000000"/>
+                </a:solidFill>
+                <a:latin typeface="+mn-lt"/>
+                <a:ea typeface="+mn-ea"/>
+                <a:cs typeface="+mn-cs"/>
+              </a:defRPr>
+            </a:lvl7pPr>
+            <a:lvl8pPr marL="0" marR="0" indent="3200400" algn="l" defTabSz="2438338">
+              <a:lnSpc>
+                <a:spcPct val="80000"/>
+              </a:lnSpc>
+              <a:spcBef>
+                <a:spcPts val="0"/>
+              </a:spcBef>
+              <a:spcAft>
+                <a:spcPts val="0"/>
+              </a:spcAft>
+              <a:buClrTx/>
+              <a:buSzTx/>
+              <a:buFontTx/>
+              <a:buNone/>
+              <a:defRPr sz="8500" b="1" i="0" u="none" strike="noStrike" cap="none" spc="-170">
+                <a:solidFill>
+                  <a:srgbClr val="000000"/>
+                </a:solidFill>
+                <a:latin typeface="+mn-lt"/>
+                <a:ea typeface="+mn-ea"/>
+                <a:cs typeface="+mn-cs"/>
+              </a:defRPr>
+            </a:lvl8pPr>
+            <a:lvl9pPr marL="0" marR="0" indent="3657600" algn="l" defTabSz="2438338">
+              <a:lnSpc>
+                <a:spcPct val="80000"/>
+              </a:lnSpc>
+              <a:spcBef>
+                <a:spcPts val="0"/>
+              </a:spcBef>
+              <a:spcAft>
+                <a:spcPts val="0"/>
+              </a:spcAft>
+              <a:buClrTx/>
+              <a:buSzTx/>
+              <a:buFontTx/>
+              <a:buNone/>
+              <a:defRPr sz="8500" b="1" i="0" u="none" strike="noStrike" cap="none" spc="-170">
+                <a:solidFill>
+                  <a:srgbClr val="000000"/>
+                </a:solidFill>
+                <a:latin typeface="+mn-lt"/>
+                <a:ea typeface="+mn-ea"/>
+                <a:cs typeface="+mn-cs"/>
+              </a:defRPr>
+            </a:lvl9pPr>
+          </a:lstStyle>
+          <a:p>
+            <a:pPr>
+              <a:defRPr/>
+            </a:pPr>
+            <a:r>
+              <a:rPr lang="de-DE" sz="3200" b="0">
+                <a:solidFill>
+                  <a:schemeClr val="bg2">
+                    <a:lumMod val="10000"/>
+                  </a:schemeClr>
+                </a:solidFill>
+              </a:rPr>
+              <a:t>Module 1</a:t>
+            </a:r>
+            <a:endParaRPr lang="de-DE" sz="5400" b="0">
+              <a:solidFill>
+                <a:schemeClr val="bg2">
+                  <a:lumMod val="10000"/>
+                </a:schemeClr>
+              </a:solidFill>
+            </a:endParaRPr>
           </a:p>
         </p:txBody>
       </p:sp>
@@ -5410,7 +5754,7 @@
         </p:nvSpPr>
         <p:spPr bwMode="auto">
           <a:xfrm>
-            <a:off x="1111833" y="1152837"/>
+            <a:off x="1111833" y="1533021"/>
             <a:ext cx="19180975" cy="1690257"/>
           </a:xfrm>
           <a:prstGeom prst="rect">
@@ -5432,7 +5776,7 @@
             </a:pPr>
             <a:r>
               <a:rPr lang="de-DE" sz="7000"/>
-              <a:t>Module 1 – Wrap-up</a:t>
+              <a:t>Wrap-up</a:t>
             </a:r>
             <a:endParaRPr sz="7000" b="0"/>
           </a:p>
@@ -5452,8 +5796,8 @@
         </p:nvSpPr>
         <p:spPr bwMode="auto">
           <a:xfrm>
-            <a:off x="1111833" y="3582451"/>
-            <a:ext cx="22870385" cy="7390350"/>
+            <a:off x="1111833" y="5533291"/>
+            <a:ext cx="22870385" cy="5439509"/>
           </a:xfrm>
           <a:prstGeom prst="rect">
             <a:avLst/>
@@ -5714,6 +6058,269 @@
               <a:rPr lang="de-DE" sz="4400" b="0"/>
               <a:t>Any further questions? </a:t>
             </a:r>
+          </a:p>
+        </p:txBody>
+      </p:sp>
+      <p:sp>
+        <p:nvSpPr>
+          <p:cNvPr id="2" name="Thank you for your attention!">
+            <a:extLst>
+              <a:ext uri="{FF2B5EF4-FFF2-40B4-BE49-F238E27FC236}">
+                <a16:creationId xmlns:a16="http://schemas.microsoft.com/office/drawing/2014/main" id="{CD0255D7-084D-475A-D52D-F8A039DCDFE1}"/>
+              </a:ext>
+            </a:extLst>
+          </p:cNvPr>
+          <p:cNvSpPr txBox="1">
+            <a:spLocks/>
+          </p:cNvSpPr>
+          <p:nvPr/>
+        </p:nvSpPr>
+        <p:spPr bwMode="auto">
+          <a:xfrm>
+            <a:off x="1111832" y="983816"/>
+            <a:ext cx="19180975" cy="794032"/>
+          </a:xfrm>
+          <a:prstGeom prst="rect">
+            <a:avLst/>
+          </a:prstGeom>
+          <a:ln w="12700">
+            <a:miter lim="400000"/>
+          </a:ln>
+        </p:spPr>
+        <p:txBody>
+          <a:bodyPr lIns="50800" tIns="50800" rIns="50800" bIns="50800">
+            <a:normAutofit/>
+          </a:bodyPr>
+          <a:lstStyle>
+            <a:lvl1pPr marL="0" marR="0" indent="0" algn="l" defTabSz="2438338">
+              <a:lnSpc>
+                <a:spcPct val="80000"/>
+              </a:lnSpc>
+              <a:spcBef>
+                <a:spcPts val="0"/>
+              </a:spcBef>
+              <a:spcAft>
+                <a:spcPts val="0"/>
+              </a:spcAft>
+              <a:buClrTx/>
+              <a:buSzTx/>
+              <a:buFontTx/>
+              <a:buNone/>
+              <a:defRPr sz="7500" b="1" i="0" u="none" strike="noStrike" cap="none" spc="-150">
+                <a:solidFill>
+                  <a:srgbClr val="000000"/>
+                </a:solidFill>
+                <a:latin typeface="+mn-lt"/>
+                <a:ea typeface="+mn-ea"/>
+                <a:cs typeface="+mn-cs"/>
+              </a:defRPr>
+            </a:lvl1pPr>
+            <a:lvl2pPr marL="0" marR="0" indent="457200" algn="l" defTabSz="2438338">
+              <a:lnSpc>
+                <a:spcPct val="80000"/>
+              </a:lnSpc>
+              <a:spcBef>
+                <a:spcPts val="0"/>
+              </a:spcBef>
+              <a:spcAft>
+                <a:spcPts val="0"/>
+              </a:spcAft>
+              <a:buClrTx/>
+              <a:buSzTx/>
+              <a:buFontTx/>
+              <a:buNone/>
+              <a:defRPr sz="8500" b="1" i="0" u="none" strike="noStrike" cap="none" spc="-170">
+                <a:solidFill>
+                  <a:srgbClr val="000000"/>
+                </a:solidFill>
+                <a:latin typeface="+mn-lt"/>
+                <a:ea typeface="+mn-ea"/>
+                <a:cs typeface="+mn-cs"/>
+              </a:defRPr>
+            </a:lvl2pPr>
+            <a:lvl3pPr marL="0" marR="0" indent="914400" algn="l" defTabSz="2438338">
+              <a:lnSpc>
+                <a:spcPct val="80000"/>
+              </a:lnSpc>
+              <a:spcBef>
+                <a:spcPts val="0"/>
+              </a:spcBef>
+              <a:spcAft>
+                <a:spcPts val="0"/>
+              </a:spcAft>
+              <a:buClrTx/>
+              <a:buSzTx/>
+              <a:buFontTx/>
+              <a:buNone/>
+              <a:defRPr sz="8500" b="1" i="0" u="none" strike="noStrike" cap="none" spc="-170">
+                <a:solidFill>
+                  <a:srgbClr val="000000"/>
+                </a:solidFill>
+                <a:latin typeface="+mn-lt"/>
+                <a:ea typeface="+mn-ea"/>
+                <a:cs typeface="+mn-cs"/>
+              </a:defRPr>
+            </a:lvl3pPr>
+            <a:lvl4pPr marL="0" marR="0" indent="1371600" algn="l" defTabSz="2438338">
+              <a:lnSpc>
+                <a:spcPct val="80000"/>
+              </a:lnSpc>
+              <a:spcBef>
+                <a:spcPts val="0"/>
+              </a:spcBef>
+              <a:spcAft>
+                <a:spcPts val="0"/>
+              </a:spcAft>
+              <a:buClrTx/>
+              <a:buSzTx/>
+              <a:buFontTx/>
+              <a:buNone/>
+              <a:defRPr sz="8500" b="1" i="0" u="none" strike="noStrike" cap="none" spc="-170">
+                <a:solidFill>
+                  <a:srgbClr val="000000"/>
+                </a:solidFill>
+                <a:latin typeface="+mn-lt"/>
+                <a:ea typeface="+mn-ea"/>
+                <a:cs typeface="+mn-cs"/>
+              </a:defRPr>
+            </a:lvl4pPr>
+            <a:lvl5pPr marL="0" marR="0" indent="1828800" algn="l" defTabSz="2438338">
+              <a:lnSpc>
+                <a:spcPct val="80000"/>
+              </a:lnSpc>
+              <a:spcBef>
+                <a:spcPts val="0"/>
+              </a:spcBef>
+              <a:spcAft>
+                <a:spcPts val="0"/>
+              </a:spcAft>
+              <a:buClrTx/>
+              <a:buSzTx/>
+              <a:buFontTx/>
+              <a:buNone/>
+              <a:defRPr sz="8500" b="1" i="0" u="none" strike="noStrike" cap="none" spc="-170">
+                <a:solidFill>
+                  <a:srgbClr val="000000"/>
+                </a:solidFill>
+                <a:latin typeface="+mn-lt"/>
+                <a:ea typeface="+mn-ea"/>
+                <a:cs typeface="+mn-cs"/>
+              </a:defRPr>
+            </a:lvl5pPr>
+            <a:lvl6pPr marL="0" marR="0" indent="2286000" algn="l" defTabSz="2438338">
+              <a:lnSpc>
+                <a:spcPct val="80000"/>
+              </a:lnSpc>
+              <a:spcBef>
+                <a:spcPts val="0"/>
+              </a:spcBef>
+              <a:spcAft>
+                <a:spcPts val="0"/>
+              </a:spcAft>
+              <a:buClrTx/>
+              <a:buSzTx/>
+              <a:buFontTx/>
+              <a:buNone/>
+              <a:defRPr sz="8500" b="1" i="0" u="none" strike="noStrike" cap="none" spc="-170">
+                <a:solidFill>
+                  <a:srgbClr val="000000"/>
+                </a:solidFill>
+                <a:latin typeface="+mn-lt"/>
+                <a:ea typeface="+mn-ea"/>
+                <a:cs typeface="+mn-cs"/>
+              </a:defRPr>
+            </a:lvl6pPr>
+            <a:lvl7pPr marL="0" marR="0" indent="2743200" algn="l" defTabSz="2438338">
+              <a:lnSpc>
+                <a:spcPct val="80000"/>
+              </a:lnSpc>
+              <a:spcBef>
+                <a:spcPts val="0"/>
+              </a:spcBef>
+              <a:spcAft>
+                <a:spcPts val="0"/>
+              </a:spcAft>
+              <a:buClrTx/>
+              <a:buSzTx/>
+              <a:buFontTx/>
+              <a:buNone/>
+              <a:defRPr sz="8500" b="1" i="0" u="none" strike="noStrike" cap="none" spc="-170">
+                <a:solidFill>
+                  <a:srgbClr val="000000"/>
+                </a:solidFill>
+                <a:latin typeface="+mn-lt"/>
+                <a:ea typeface="+mn-ea"/>
+                <a:cs typeface="+mn-cs"/>
+              </a:defRPr>
+            </a:lvl7pPr>
+            <a:lvl8pPr marL="0" marR="0" indent="3200400" algn="l" defTabSz="2438338">
+              <a:lnSpc>
+                <a:spcPct val="80000"/>
+              </a:lnSpc>
+              <a:spcBef>
+                <a:spcPts val="0"/>
+              </a:spcBef>
+              <a:spcAft>
+                <a:spcPts val="0"/>
+              </a:spcAft>
+              <a:buClrTx/>
+              <a:buSzTx/>
+              <a:buFontTx/>
+              <a:buNone/>
+              <a:defRPr sz="8500" b="1" i="0" u="none" strike="noStrike" cap="none" spc="-170">
+                <a:solidFill>
+                  <a:srgbClr val="000000"/>
+                </a:solidFill>
+                <a:latin typeface="+mn-lt"/>
+                <a:ea typeface="+mn-ea"/>
+                <a:cs typeface="+mn-cs"/>
+              </a:defRPr>
+            </a:lvl8pPr>
+            <a:lvl9pPr marL="0" marR="0" indent="3657600" algn="l" defTabSz="2438338">
+              <a:lnSpc>
+                <a:spcPct val="80000"/>
+              </a:lnSpc>
+              <a:spcBef>
+                <a:spcPts val="0"/>
+              </a:spcBef>
+              <a:spcAft>
+                <a:spcPts val="0"/>
+              </a:spcAft>
+              <a:buClrTx/>
+              <a:buSzTx/>
+              <a:buFontTx/>
+              <a:buNone/>
+              <a:defRPr sz="8500" b="1" i="0" u="none" strike="noStrike" cap="none" spc="-170">
+                <a:solidFill>
+                  <a:srgbClr val="000000"/>
+                </a:solidFill>
+                <a:latin typeface="+mn-lt"/>
+                <a:ea typeface="+mn-ea"/>
+                <a:cs typeface="+mn-cs"/>
+              </a:defRPr>
+            </a:lvl9pPr>
+          </a:lstStyle>
+          <a:p>
+            <a:pPr>
+              <a:defRPr/>
+            </a:pPr>
+            <a:r>
+              <a:rPr lang="de-DE" sz="3200" b="0">
+                <a:solidFill>
+                  <a:schemeClr val="bg2">
+                    <a:lumMod val="10000"/>
+                  </a:schemeClr>
+                </a:solidFill>
+              </a:rPr>
+              <a:t>Module 1</a:t>
+            </a:r>
+            <a:endParaRPr lang="de-DE" sz="5400" b="0">
+              <a:solidFill>
+                <a:schemeClr val="bg2">
+                  <a:lumMod val="10000"/>
+                </a:schemeClr>
+              </a:solidFill>
+            </a:endParaRPr>
           </a:p>
         </p:txBody>
       </p:sp>

</xml_diff>